<commit_message>
PMOD 3.3 voltage shifter has high impedance, so 50 ohm impedance cannot be used. PMOD in ZCU111 should be restricted to slow signal process
</commit_message>
<xml_diff>
--- a/Documents/PPT/LabMeeting/TEMP/TEMP_RFSoC_Meeting.pptx
+++ b/Documents/PPT/LabMeeting/TEMP/TEMP_RFSoC_Meeting.pptx
@@ -199,7 +199,7 @@
           <a:p>
             <a:fld id="{8ECD4658-FC5F-4C4A-9C84-93B50C1C7551}" type="datetimeFigureOut">
               <a:rPr kumimoji="1" lang="ko-Kore-KR" altLang="en-US" smtClean="0"/>
-              <a:t>08/09/2023</a:t>
+              <a:t>10/04/2023</a:t>
             </a:fld>
             <a:endParaRPr kumimoji="1" lang="ko-Kore-KR" altLang="en-US"/>
           </a:p>
@@ -599,38 +599,6 @@
           </a:p>
         </p:txBody>
       </p:sp>
-      <p:pic>
-        <p:nvPicPr>
-          <p:cNvPr id="7" name="그림 6">
-            <a:extLst>
-              <a:ext uri="{FF2B5EF4-FFF2-40B4-BE49-F238E27FC236}">
-                <a16:creationId xmlns:a16="http://schemas.microsoft.com/office/drawing/2014/main" id="{90DFBE24-706B-3849-8E2C-E747F7284C61}"/>
-              </a:ext>
-            </a:extLst>
-          </p:cNvPr>
-          <p:cNvPicPr>
-            <a:picLocks noChangeAspect="1"/>
-          </p:cNvPicPr>
-          <p:nvPr userDrawn="1"/>
-        </p:nvPicPr>
-        <p:blipFill>
-          <a:blip r:embed="rId2">
-            <a:alphaModFix/>
-          </a:blip>
-          <a:stretch>
-            <a:fillRect/>
-          </a:stretch>
-        </p:blipFill>
-        <p:spPr>
-          <a:xfrm>
-            <a:off x="10616693" y="6272344"/>
-            <a:ext cx="1575307" cy="585616"/>
-          </a:xfrm>
-          <a:prstGeom prst="rect">
-            <a:avLst/>
-          </a:prstGeom>
-        </p:spPr>
-      </p:pic>
       <p:sp>
         <p:nvSpPr>
           <p:cNvPr id="9" name="직사각형 8">
@@ -749,6 +717,36 @@
           </a:p>
         </p:txBody>
       </p:sp>
+      <p:pic>
+        <p:nvPicPr>
+          <p:cNvPr id="5" name="그림 4">
+            <a:extLst>
+              <a:ext uri="{FF2B5EF4-FFF2-40B4-BE49-F238E27FC236}">
+                <a16:creationId xmlns:a16="http://schemas.microsoft.com/office/drawing/2014/main" id="{B472E457-612B-471F-996B-119D8183038F}"/>
+              </a:ext>
+            </a:extLst>
+          </p:cNvPr>
+          <p:cNvPicPr>
+            <a:picLocks noChangeAspect="1"/>
+          </p:cNvPicPr>
+          <p:nvPr userDrawn="1"/>
+        </p:nvPicPr>
+        <p:blipFill>
+          <a:blip r:embed="rId2"/>
+          <a:stretch>
+            <a:fillRect/>
+          </a:stretch>
+        </p:blipFill>
+        <p:spPr>
+          <a:xfrm>
+            <a:off x="10668000" y="5663967"/>
+            <a:ext cx="1194033" cy="1194033"/>
+          </a:xfrm>
+          <a:prstGeom prst="rect">
+            <a:avLst/>
+          </a:prstGeom>
+        </p:spPr>
+      </p:pic>
     </p:spTree>
     <p:extLst>
       <p:ext uri="{BB962C8B-B14F-4D97-AF65-F5344CB8AC3E}">
@@ -4101,7 +4099,7 @@
           <a:lstStyle/>
           <a:p>
             <a:r>
-              <a:rPr kumimoji="1" lang="en-US" altLang="ko-KR">
+              <a:rPr kumimoji="1" lang="en-US" altLang="ko-KR" dirty="0">
                 <a:ea typeface="Verdana" panose="020B0604030504040204" pitchFamily="34" charset="0"/>
               </a:rPr>
               <a:t>2023. 3. 29.</a:t>

</xml_diff>